<commit_message>
Atualização Apresentação Sprint 1
</commit_message>
<xml_diff>
--- a/Documentos/Apresentação - Sprint 1.pptx
+++ b/Documentos/Apresentação - Sprint 1.pptx
@@ -13,10 +13,11 @@
     <p:sldId id="265" r:id="rId7"/>
     <p:sldId id="262" r:id="rId8"/>
     <p:sldId id="263" r:id="rId9"/>
-    <p:sldId id="261" r:id="rId10"/>
-    <p:sldId id="260" r:id="rId11"/>
+    <p:sldId id="260" r:id="rId10"/>
+    <p:sldId id="268" r:id="rId11"/>
     <p:sldId id="257" r:id="rId12"/>
-    <p:sldId id="264" r:id="rId13"/>
+    <p:sldId id="261" r:id="rId13"/>
+    <p:sldId id="264" r:id="rId14"/>
   </p:sldIdLst>
   <p:sldSz cx="12192000" cy="6858000"/>
   <p:notesSz cx="6858000" cy="9144000"/>
@@ -115,7 +116,207 @@
       </a:defRPr>
     </a:lvl9pPr>
   </p:defaultTextStyle>
+  <p:extLst>
+    <p:ext uri="{EFAFB233-063F-42B5-8137-9DF3F51BA10A}">
+      <p15:sldGuideLst xmlns:p15="http://schemas.microsoft.com/office/powerpoint/2012/main"/>
+    </p:ext>
+  </p:extLst>
 </p:presentation>
+</file>
+
+<file path=ppt/revisionInfo.xml><?xml version="1.0" encoding="utf-8"?>
+<p1510:revInfo xmlns:a="http://schemas.openxmlformats.org/drawingml/2006/main" xmlns:r="http://schemas.openxmlformats.org/officeDocument/2006/relationships" xmlns:p1510="http://schemas.microsoft.com/office/powerpoint/2015/10/main">
+  <p1510:revLst>
+    <p1510:client id="{D0F5F4C9-8254-49D2-8834-678155235284}" v="12" dt="2021-03-03T20:08:44.385"/>
+  </p1510:revLst>
+</p1510:revInfo>
+</file>
+
+<file path=ppt/changesInfos/changesInfo1.xml><?xml version="1.0" encoding="utf-8"?>
+<pc:chgInfo xmlns:a="http://schemas.openxmlformats.org/drawingml/2006/main" xmlns:r="http://schemas.openxmlformats.org/officeDocument/2006/relationships" xmlns:ac="http://schemas.microsoft.com/office/drawing/2013/main/command" xmlns:pc="http://schemas.microsoft.com/office/powerpoint/2013/main/command">
+  <pc:docChgLst>
+    <pc:chgData name="Rodrigo Cunha" userId="485e093414a33d36" providerId="LiveId" clId="{D0F5F4C9-8254-49D2-8834-678155235284}"/>
+    <pc:docChg chg="undo custSel addSld modSld sldOrd">
+      <pc:chgData name="Rodrigo Cunha" userId="485e093414a33d36" providerId="LiveId" clId="{D0F5F4C9-8254-49D2-8834-678155235284}" dt="2021-03-03T20:15:14.495" v="1167" actId="113"/>
+      <pc:docMkLst>
+        <pc:docMk/>
+      </pc:docMkLst>
+      <pc:sldChg chg="modSp mod">
+        <pc:chgData name="Rodrigo Cunha" userId="485e093414a33d36" providerId="LiveId" clId="{D0F5F4C9-8254-49D2-8834-678155235284}" dt="2021-03-03T20:09:48.153" v="870" actId="20577"/>
+        <pc:sldMkLst>
+          <pc:docMk/>
+          <pc:sldMk cId="1008807965" sldId="257"/>
+        </pc:sldMkLst>
+        <pc:spChg chg="mod">
+          <ac:chgData name="Rodrigo Cunha" userId="485e093414a33d36" providerId="LiveId" clId="{D0F5F4C9-8254-49D2-8834-678155235284}" dt="2021-03-03T19:56:00.334" v="251" actId="1076"/>
+          <ac:spMkLst>
+            <pc:docMk/>
+            <pc:sldMk cId="1008807965" sldId="257"/>
+            <ac:spMk id="10" creationId="{CB39E8D3-D155-4669-AC8A-A3F31A76D0BD}"/>
+          </ac:spMkLst>
+        </pc:spChg>
+        <pc:spChg chg="mod">
+          <ac:chgData name="Rodrigo Cunha" userId="485e093414a33d36" providerId="LiveId" clId="{D0F5F4C9-8254-49D2-8834-678155235284}" dt="2021-03-03T20:09:48.153" v="870" actId="20577"/>
+          <ac:spMkLst>
+            <pc:docMk/>
+            <pc:sldMk cId="1008807965" sldId="257"/>
+            <ac:spMk id="15" creationId="{DBC1C8B9-BB84-4CA2-A855-6958A813AD98}"/>
+          </ac:spMkLst>
+        </pc:spChg>
+        <pc:spChg chg="mod">
+          <ac:chgData name="Rodrigo Cunha" userId="485e093414a33d36" providerId="LiveId" clId="{D0F5F4C9-8254-49D2-8834-678155235284}" dt="2021-03-03T19:55:49.502" v="248" actId="1076"/>
+          <ac:spMkLst>
+            <pc:docMk/>
+            <pc:sldMk cId="1008807965" sldId="257"/>
+            <ac:spMk id="17" creationId="{F4271F34-B73B-4D32-8E64-C8486D551734}"/>
+          </ac:spMkLst>
+        </pc:spChg>
+      </pc:sldChg>
+      <pc:sldChg chg="addSp delSp modSp mod ord">
+        <pc:chgData name="Rodrigo Cunha" userId="485e093414a33d36" providerId="LiveId" clId="{D0F5F4C9-8254-49D2-8834-678155235284}" dt="2021-03-03T20:15:14.495" v="1167" actId="113"/>
+        <pc:sldMkLst>
+          <pc:docMk/>
+          <pc:sldMk cId="3404600451" sldId="261"/>
+        </pc:sldMkLst>
+        <pc:spChg chg="del">
+          <ac:chgData name="Rodrigo Cunha" userId="485e093414a33d36" providerId="LiveId" clId="{D0F5F4C9-8254-49D2-8834-678155235284}" dt="2021-03-03T19:58:13.368" v="263" actId="478"/>
+          <ac:spMkLst>
+            <pc:docMk/>
+            <pc:sldMk cId="3404600451" sldId="261"/>
+            <ac:spMk id="2" creationId="{1F6E1E7A-F978-4628-926F-0D6A0AD1DB73}"/>
+          </ac:spMkLst>
+        </pc:spChg>
+        <pc:spChg chg="del">
+          <ac:chgData name="Rodrigo Cunha" userId="485e093414a33d36" providerId="LiveId" clId="{D0F5F4C9-8254-49D2-8834-678155235284}" dt="2021-03-03T19:56:36.462" v="252" actId="478"/>
+          <ac:spMkLst>
+            <pc:docMk/>
+            <pc:sldMk cId="3404600451" sldId="261"/>
+            <ac:spMk id="3" creationId="{D0118B34-BE49-4543-BD0C-0C7F2B78E44C}"/>
+          </ac:spMkLst>
+        </pc:spChg>
+        <pc:spChg chg="add del mod">
+          <ac:chgData name="Rodrigo Cunha" userId="485e093414a33d36" providerId="LiveId" clId="{D0F5F4C9-8254-49D2-8834-678155235284}" dt="2021-03-03T19:58:14.884" v="265" actId="478"/>
+          <ac:spMkLst>
+            <pc:docMk/>
+            <pc:sldMk cId="3404600451" sldId="261"/>
+            <ac:spMk id="8" creationId="{E3B05AE5-555C-4C44-9B1D-7A3EF80B1E25}"/>
+          </ac:spMkLst>
+        </pc:spChg>
+        <pc:spChg chg="add mod">
+          <ac:chgData name="Rodrigo Cunha" userId="485e093414a33d36" providerId="LiveId" clId="{D0F5F4C9-8254-49D2-8834-678155235284}" dt="2021-03-03T20:15:14.495" v="1167" actId="113"/>
+          <ac:spMkLst>
+            <pc:docMk/>
+            <pc:sldMk cId="3404600451" sldId="261"/>
+            <ac:spMk id="9" creationId="{689F66C2-96C0-44F4-92F4-31F472BD81C7}"/>
+          </ac:spMkLst>
+        </pc:spChg>
+        <pc:spChg chg="add mod">
+          <ac:chgData name="Rodrigo Cunha" userId="485e093414a33d36" providerId="LiveId" clId="{D0F5F4C9-8254-49D2-8834-678155235284}" dt="2021-03-03T20:15:14.495" v="1167" actId="113"/>
+          <ac:spMkLst>
+            <pc:docMk/>
+            <pc:sldMk cId="3404600451" sldId="261"/>
+            <ac:spMk id="10" creationId="{A35A4D18-8625-4E11-B5E7-5EAD119BB516}"/>
+          </ac:spMkLst>
+        </pc:spChg>
+        <pc:spChg chg="add del mod">
+          <ac:chgData name="Rodrigo Cunha" userId="485e093414a33d36" providerId="LiveId" clId="{D0F5F4C9-8254-49D2-8834-678155235284}" dt="2021-03-03T19:59:28.849" v="288"/>
+          <ac:spMkLst>
+            <pc:docMk/>
+            <pc:sldMk cId="3404600451" sldId="261"/>
+            <ac:spMk id="11" creationId="{745318CC-80CE-44C3-8799-1F83E84D3E1F}"/>
+          </ac:spMkLst>
+        </pc:spChg>
+        <pc:spChg chg="add mod">
+          <ac:chgData name="Rodrigo Cunha" userId="485e093414a33d36" providerId="LiveId" clId="{D0F5F4C9-8254-49D2-8834-678155235284}" dt="2021-03-03T20:08:14.237" v="806" actId="207"/>
+          <ac:spMkLst>
+            <pc:docMk/>
+            <pc:sldMk cId="3404600451" sldId="261"/>
+            <ac:spMk id="12" creationId="{B9D0E7E8-3491-4543-85D3-68B40A915558}"/>
+          </ac:spMkLst>
+        </pc:spChg>
+        <pc:spChg chg="add mod">
+          <ac:chgData name="Rodrigo Cunha" userId="485e093414a33d36" providerId="LiveId" clId="{D0F5F4C9-8254-49D2-8834-678155235284}" dt="2021-03-03T20:08:14.237" v="806" actId="207"/>
+          <ac:spMkLst>
+            <pc:docMk/>
+            <pc:sldMk cId="3404600451" sldId="261"/>
+            <ac:spMk id="13" creationId="{7DC1CBE1-C1E8-460B-901D-ED2A6B86881E}"/>
+          </ac:spMkLst>
+        </pc:spChg>
+        <pc:spChg chg="add mod">
+          <ac:chgData name="Rodrigo Cunha" userId="485e093414a33d36" providerId="LiveId" clId="{D0F5F4C9-8254-49D2-8834-678155235284}" dt="2021-03-03T20:08:14.237" v="806" actId="207"/>
+          <ac:spMkLst>
+            <pc:docMk/>
+            <pc:sldMk cId="3404600451" sldId="261"/>
+            <ac:spMk id="14" creationId="{0CAD9B9B-8727-4CDA-8E58-9534093BCB90}"/>
+          </ac:spMkLst>
+        </pc:spChg>
+        <pc:spChg chg="add mod">
+          <ac:chgData name="Rodrigo Cunha" userId="485e093414a33d36" providerId="LiveId" clId="{D0F5F4C9-8254-49D2-8834-678155235284}" dt="2021-03-03T20:08:14.237" v="806" actId="207"/>
+          <ac:spMkLst>
+            <pc:docMk/>
+            <pc:sldMk cId="3404600451" sldId="261"/>
+            <ac:spMk id="15" creationId="{133CEE61-2CE6-44C9-A0F1-F27730367E45}"/>
+          </ac:spMkLst>
+        </pc:spChg>
+        <pc:spChg chg="add mod">
+          <ac:chgData name="Rodrigo Cunha" userId="485e093414a33d36" providerId="LiveId" clId="{D0F5F4C9-8254-49D2-8834-678155235284}" dt="2021-03-03T20:15:04.133" v="1165" actId="20577"/>
+          <ac:spMkLst>
+            <pc:docMk/>
+            <pc:sldMk cId="3404600451" sldId="261"/>
+            <ac:spMk id="16" creationId="{FD053813-73C9-4B3F-8E46-22D5A0B39F32}"/>
+          </ac:spMkLst>
+        </pc:spChg>
+        <pc:spChg chg="add mod">
+          <ac:chgData name="Rodrigo Cunha" userId="485e093414a33d36" providerId="LiveId" clId="{D0F5F4C9-8254-49D2-8834-678155235284}" dt="2021-03-03T20:11:50.709" v="1028" actId="20577"/>
+          <ac:spMkLst>
+            <pc:docMk/>
+            <pc:sldMk cId="3404600451" sldId="261"/>
+            <ac:spMk id="17" creationId="{C3611ACD-AA20-40E3-AEA0-466671F7511D}"/>
+          </ac:spMkLst>
+        </pc:spChg>
+        <pc:picChg chg="del">
+          <ac:chgData name="Rodrigo Cunha" userId="485e093414a33d36" providerId="LiveId" clId="{D0F5F4C9-8254-49D2-8834-678155235284}" dt="2021-03-03T19:58:13.833" v="264" actId="478"/>
+          <ac:picMkLst>
+            <pc:docMk/>
+            <pc:sldMk cId="3404600451" sldId="261"/>
+            <ac:picMk id="4" creationId="{66976179-B6F2-4140-AF27-573BF867F9BE}"/>
+          </ac:picMkLst>
+        </pc:picChg>
+        <pc:picChg chg="add del mod">
+          <ac:chgData name="Rodrigo Cunha" userId="485e093414a33d36" providerId="LiveId" clId="{D0F5F4C9-8254-49D2-8834-678155235284}" dt="2021-03-03T19:57:52.922" v="258" actId="478"/>
+          <ac:picMkLst>
+            <pc:docMk/>
+            <pc:sldMk cId="3404600451" sldId="261"/>
+            <ac:picMk id="5" creationId="{B94BA9D3-7AD4-41E3-BFAD-B5A22B305A1B}"/>
+          </ac:picMkLst>
+        </pc:picChg>
+        <pc:picChg chg="add mod">
+          <ac:chgData name="Rodrigo Cunha" userId="485e093414a33d36" providerId="LiveId" clId="{D0F5F4C9-8254-49D2-8834-678155235284}" dt="2021-03-03T20:08:39.789" v="809" actId="1076"/>
+          <ac:picMkLst>
+            <pc:docMk/>
+            <pc:sldMk cId="3404600451" sldId="261"/>
+            <ac:picMk id="6" creationId="{EC8FCA96-3E49-405B-B40D-87EBF9AD9F35}"/>
+          </ac:picMkLst>
+        </pc:picChg>
+      </pc:sldChg>
+      <pc:sldChg chg="delSp add mod">
+        <pc:chgData name="Rodrigo Cunha" userId="485e093414a33d36" providerId="LiveId" clId="{D0F5F4C9-8254-49D2-8834-678155235284}" dt="2021-03-03T19:58:08.776" v="262" actId="478"/>
+        <pc:sldMkLst>
+          <pc:docMk/>
+          <pc:sldMk cId="287346398" sldId="268"/>
+        </pc:sldMkLst>
+        <pc:picChg chg="del">
+          <ac:chgData name="Rodrigo Cunha" userId="485e093414a33d36" providerId="LiveId" clId="{D0F5F4C9-8254-49D2-8834-678155235284}" dt="2021-03-03T19:58:08.776" v="262" actId="478"/>
+          <ac:picMkLst>
+            <pc:docMk/>
+            <pc:sldMk cId="287346398" sldId="268"/>
+            <ac:picMk id="6" creationId="{EC8FCA96-3E49-405B-B40D-87EBF9AD9F35}"/>
+          </ac:picMkLst>
+        </pc:picChg>
+      </pc:sldChg>
+    </pc:docChg>
+  </pc:docChgLst>
+</pc:chgInfo>
 </file>
 
 <file path=ppt/slideLayouts/slideLayout1.xml><?xml version="1.0" encoding="utf-8"?>
@@ -265,7 +466,7 @@
           <a:p>
             <a:fld id="{355F770F-5898-4050-BE6B-88A08486AE6B}" type="datetimeFigureOut">
               <a:rPr lang="pt-BR" smtClean="0"/>
-              <a:t>02/03/2021</a:t>
+              <a:t>03/03/2021</a:t>
             </a:fld>
             <a:endParaRPr lang="pt-BR"/>
           </a:p>
@@ -463,7 +664,7 @@
           <a:p>
             <a:fld id="{355F770F-5898-4050-BE6B-88A08486AE6B}" type="datetimeFigureOut">
               <a:rPr lang="pt-BR" smtClean="0"/>
-              <a:t>02/03/2021</a:t>
+              <a:t>03/03/2021</a:t>
             </a:fld>
             <a:endParaRPr lang="pt-BR"/>
           </a:p>
@@ -671,7 +872,7 @@
           <a:p>
             <a:fld id="{355F770F-5898-4050-BE6B-88A08486AE6B}" type="datetimeFigureOut">
               <a:rPr lang="pt-BR" smtClean="0"/>
-              <a:t>02/03/2021</a:t>
+              <a:t>03/03/2021</a:t>
             </a:fld>
             <a:endParaRPr lang="pt-BR"/>
           </a:p>
@@ -869,7 +1070,7 @@
           <a:p>
             <a:fld id="{355F770F-5898-4050-BE6B-88A08486AE6B}" type="datetimeFigureOut">
               <a:rPr lang="pt-BR" smtClean="0"/>
-              <a:t>02/03/2021</a:t>
+              <a:t>03/03/2021</a:t>
             </a:fld>
             <a:endParaRPr lang="pt-BR"/>
           </a:p>
@@ -1144,7 +1345,7 @@
           <a:p>
             <a:fld id="{355F770F-5898-4050-BE6B-88A08486AE6B}" type="datetimeFigureOut">
               <a:rPr lang="pt-BR" smtClean="0"/>
-              <a:t>02/03/2021</a:t>
+              <a:t>03/03/2021</a:t>
             </a:fld>
             <a:endParaRPr lang="pt-BR"/>
           </a:p>
@@ -1409,7 +1610,7 @@
           <a:p>
             <a:fld id="{355F770F-5898-4050-BE6B-88A08486AE6B}" type="datetimeFigureOut">
               <a:rPr lang="pt-BR" smtClean="0"/>
-              <a:t>02/03/2021</a:t>
+              <a:t>03/03/2021</a:t>
             </a:fld>
             <a:endParaRPr lang="pt-BR"/>
           </a:p>
@@ -1821,7 +2022,7 @@
           <a:p>
             <a:fld id="{355F770F-5898-4050-BE6B-88A08486AE6B}" type="datetimeFigureOut">
               <a:rPr lang="pt-BR" smtClean="0"/>
-              <a:t>02/03/2021</a:t>
+              <a:t>03/03/2021</a:t>
             </a:fld>
             <a:endParaRPr lang="pt-BR"/>
           </a:p>
@@ -1962,7 +2163,7 @@
           <a:p>
             <a:fld id="{355F770F-5898-4050-BE6B-88A08486AE6B}" type="datetimeFigureOut">
               <a:rPr lang="pt-BR" smtClean="0"/>
-              <a:t>02/03/2021</a:t>
+              <a:t>03/03/2021</a:t>
             </a:fld>
             <a:endParaRPr lang="pt-BR"/>
           </a:p>
@@ -2075,7 +2276,7 @@
           <a:p>
             <a:fld id="{355F770F-5898-4050-BE6B-88A08486AE6B}" type="datetimeFigureOut">
               <a:rPr lang="pt-BR" smtClean="0"/>
-              <a:t>02/03/2021</a:t>
+              <a:t>03/03/2021</a:t>
             </a:fld>
             <a:endParaRPr lang="pt-BR"/>
           </a:p>
@@ -2386,7 +2587,7 @@
           <a:p>
             <a:fld id="{355F770F-5898-4050-BE6B-88A08486AE6B}" type="datetimeFigureOut">
               <a:rPr lang="pt-BR" smtClean="0"/>
-              <a:t>02/03/2021</a:t>
+              <a:t>03/03/2021</a:t>
             </a:fld>
             <a:endParaRPr lang="pt-BR"/>
           </a:p>
@@ -2674,7 +2875,7 @@
           <a:p>
             <a:fld id="{355F770F-5898-4050-BE6B-88A08486AE6B}" type="datetimeFigureOut">
               <a:rPr lang="pt-BR" smtClean="0"/>
-              <a:t>02/03/2021</a:t>
+              <a:t>03/03/2021</a:t>
             </a:fld>
             <a:endParaRPr lang="pt-BR"/>
           </a:p>
@@ -2918,7 +3119,7 @@
           <a:p>
             <a:fld id="{355F770F-5898-4050-BE6B-88A08486AE6B}" type="datetimeFigureOut">
               <a:rPr lang="pt-BR" smtClean="0"/>
-              <a:t>02/03/2021</a:t>
+              <a:t>03/03/2021</a:t>
             </a:fld>
             <a:endParaRPr lang="pt-BR"/>
           </a:p>
@@ -3423,53 +3624,15 @@
           <a:lstStyle/>
           <a:p>
             <a:r>
-              <a:rPr lang="pt-BR" b="1">
+              <a:rPr lang="pt-BR" b="1" dirty="0">
                 <a:solidFill>
                   <a:srgbClr val="FDC500"/>
                 </a:solidFill>
                 <a:latin typeface="Rajdhani" panose="02000000000000000000" pitchFamily="2" charset="0"/>
                 <a:cs typeface="Rajdhani" panose="02000000000000000000" pitchFamily="2" charset="0"/>
               </a:rPr>
-              <a:t>Wireframe Bootcamp</a:t>
-            </a:r>
-            <a:endParaRPr lang="pt-BR" b="1" dirty="0">
-              <a:solidFill>
-                <a:srgbClr val="FDC500"/>
-              </a:solidFill>
-              <a:latin typeface="Rajdhani" panose="02000000000000000000" pitchFamily="2" charset="0"/>
-              <a:cs typeface="Rajdhani" panose="02000000000000000000" pitchFamily="2" charset="0"/>
-            </a:endParaRPr>
-          </a:p>
-        </p:txBody>
-      </p:sp>
-      <p:sp>
-        <p:nvSpPr>
-          <p:cNvPr id="3" name="Espaço Reservado para Conteúdo 2">
-            <a:extLst>
-              <a:ext uri="{FF2B5EF4-FFF2-40B4-BE49-F238E27FC236}">
-                <a16:creationId xmlns:a16="http://schemas.microsoft.com/office/drawing/2014/main" id="{D0118B34-BE49-4543-BD0C-0C7F2B78E44C}"/>
-              </a:ext>
-            </a:extLst>
-          </p:cNvPr>
-          <p:cNvSpPr>
-            <a:spLocks noGrp="1"/>
-          </p:cNvSpPr>
-          <p:nvPr>
-            <p:ph idx="1"/>
-          </p:nvPr>
-        </p:nvSpPr>
-        <p:spPr/>
-        <p:txBody>
-          <a:bodyPr/>
-          <a:lstStyle/>
-          <a:p>
-            <a:endParaRPr lang="pt-BR" dirty="0">
-              <a:solidFill>
-                <a:schemeClr val="bg1"/>
-              </a:solidFill>
-              <a:latin typeface="Rajdhani" panose="02000000000000000000" pitchFamily="2" charset="0"/>
-              <a:cs typeface="Rajdhani" panose="02000000000000000000" pitchFamily="2" charset="0"/>
-            </a:endParaRPr>
+              <a:t>Mapa de Empatia</a:t>
+            </a:r>
           </a:p>
         </p:txBody>
       </p:sp>
@@ -3478,7 +3641,7 @@
           <p:cNvPr id="4" name="Imagem 3" descr="Logotipo, Ícone&#10;&#10;Descrição gerada automaticamente">
             <a:extLst>
               <a:ext uri="{FF2B5EF4-FFF2-40B4-BE49-F238E27FC236}">
-                <a16:creationId xmlns:a16="http://schemas.microsoft.com/office/drawing/2014/main" id="{DEDD4ADF-B7D9-4753-AFC5-CD121136A28B}"/>
+                <a16:creationId xmlns:a16="http://schemas.microsoft.com/office/drawing/2014/main" id="{66976179-B6F2-4140-AF27-573BF867F9BE}"/>
               </a:ext>
             </a:extLst>
           </p:cNvPr>
@@ -3512,7 +3675,7 @@
     </p:spTree>
     <p:extLst>
       <p:ext uri="{BB962C8B-B14F-4D97-AF65-F5344CB8AC3E}">
-        <p14:creationId xmlns:p14="http://schemas.microsoft.com/office/powerpoint/2010/main" val="1763133396"/>
+        <p14:creationId xmlns:p14="http://schemas.microsoft.com/office/powerpoint/2010/main" val="287346398"/>
       </p:ext>
     </p:extLst>
   </p:cSld>
@@ -4287,7 +4450,7 @@
         </p:nvSpPr>
         <p:spPr>
           <a:xfrm>
-            <a:off x="6059373" y="1068329"/>
+            <a:off x="6059373" y="1068358"/>
             <a:ext cx="5699597" cy="1754326"/>
           </a:xfrm>
           <a:prstGeom prst="rect">
@@ -4924,8 +5087,8 @@
         </p:nvSpPr>
         <p:spPr>
           <a:xfrm>
-            <a:off x="218576" y="3777199"/>
-            <a:ext cx="5872726" cy="1477328"/>
+            <a:off x="226725" y="4122563"/>
+            <a:ext cx="5872726" cy="1754326"/>
           </a:xfrm>
           <a:prstGeom prst="rect">
             <a:avLst/>
@@ -5043,7 +5206,7 @@
                 <a:latin typeface="Rajdhani" panose="02000000000000000000" pitchFamily="2" charset="0"/>
                 <a:cs typeface="Rajdhani" panose="02000000000000000000" pitchFamily="2" charset="0"/>
               </a:rPr>
-              <a:t>Buscar mais participação na empresa</a:t>
+              <a:t>Buscar maior participação na empresa</a:t>
             </a:r>
           </a:p>
           <a:p>
@@ -5092,6 +5255,22 @@
                 <a:cs typeface="Rajdhani" panose="02000000000000000000" pitchFamily="2" charset="0"/>
               </a:rPr>
               <a:t>Falta de incentivo à inovação</a:t>
+            </a:r>
+          </a:p>
+          <a:p>
+            <a:pPr marL="342900" indent="-342900">
+              <a:buFont typeface="Arial" panose="020B0604020202020204" pitchFamily="34" charset="0"/>
+              <a:buChar char="•"/>
+            </a:pPr>
+            <a:r>
+              <a:rPr lang="pt-BR" sz="1800" b="1" dirty="0">
+                <a:solidFill>
+                  <a:srgbClr val="FDC500"/>
+                </a:solidFill>
+                <a:latin typeface="Rajdhani" panose="02000000000000000000" pitchFamily="2" charset="0"/>
+                <a:cs typeface="Rajdhani" panose="02000000000000000000" pitchFamily="2" charset="0"/>
+              </a:rPr>
+              <a:t>Um lugar para expressar suas ideias</a:t>
             </a:r>
           </a:p>
         </p:txBody>
@@ -5244,8 +5423,8 @@
         </p:nvSpPr>
         <p:spPr>
           <a:xfrm>
-            <a:off x="6091302" y="3705191"/>
-            <a:ext cx="5667668" cy="646331"/>
+            <a:off x="6091302" y="3984064"/>
+            <a:ext cx="5667668" cy="1754326"/>
           </a:xfrm>
           <a:prstGeom prst="rect">
             <a:avLst/>
@@ -5363,7 +5542,7 @@
                 <a:latin typeface="Rajdhani" panose="02000000000000000000" pitchFamily="2" charset="0"/>
                 <a:cs typeface="Rajdhani" panose="02000000000000000000" pitchFamily="2" charset="0"/>
               </a:rPr>
-              <a:t>App de sugestões para que todos vejam suas ideias</a:t>
+              <a:t>Plataforma de compartilhamento de sugestões e ideias</a:t>
             </a:r>
           </a:p>
           <a:p>
@@ -5371,13 +5550,48 @@
               <a:buFont typeface="Arial" panose="020B0604020202020204" pitchFamily="34" charset="0"/>
               <a:buChar char="•"/>
             </a:pPr>
-            <a:endParaRPr lang="pt-BR" sz="1800" dirty="0">
-              <a:solidFill>
-                <a:srgbClr val="FDC500"/>
-              </a:solidFill>
-              <a:latin typeface="Rajdhani" panose="02000000000000000000" pitchFamily="2" charset="0"/>
-              <a:cs typeface="Rajdhani" panose="02000000000000000000" pitchFamily="2" charset="0"/>
-            </a:endParaRPr>
+            <a:r>
+              <a:rPr lang="pt-BR" sz="1800" b="1" dirty="0">
+                <a:solidFill>
+                  <a:srgbClr val="FDC500"/>
+                </a:solidFill>
+                <a:latin typeface="Rajdhani" panose="02000000000000000000" pitchFamily="2" charset="0"/>
+                <a:cs typeface="Rajdhani" panose="02000000000000000000" pitchFamily="2" charset="0"/>
+              </a:rPr>
+              <a:t>Canal de interação entre as áreas da empresa</a:t>
+            </a:r>
+          </a:p>
+          <a:p>
+            <a:pPr marL="342900" indent="-342900">
+              <a:buFont typeface="Arial" panose="020B0604020202020204" pitchFamily="34" charset="0"/>
+              <a:buChar char="•"/>
+            </a:pPr>
+            <a:r>
+              <a:rPr lang="pt-BR" sz="1800" b="1" dirty="0">
+                <a:solidFill>
+                  <a:srgbClr val="FDC500"/>
+                </a:solidFill>
+                <a:latin typeface="Rajdhani" panose="02000000000000000000" pitchFamily="2" charset="0"/>
+                <a:cs typeface="Rajdhani" panose="02000000000000000000" pitchFamily="2" charset="0"/>
+              </a:rPr>
+              <a:t>Programas de incentivos e engajamento</a:t>
+            </a:r>
+          </a:p>
+          <a:p>
+            <a:pPr marL="342900" indent="-342900">
+              <a:buFont typeface="Arial" panose="020B0604020202020204" pitchFamily="34" charset="0"/>
+              <a:buChar char="•"/>
+            </a:pPr>
+            <a:r>
+              <a:rPr lang="pt-BR" sz="1800" b="1" dirty="0">
+                <a:solidFill>
+                  <a:srgbClr val="FDC500"/>
+                </a:solidFill>
+                <a:latin typeface="Rajdhani" panose="02000000000000000000" pitchFamily="2" charset="0"/>
+                <a:cs typeface="Rajdhani" panose="02000000000000000000" pitchFamily="2" charset="0"/>
+              </a:rPr>
+              <a:t>Criação de um ranking de reconhecimento do trabalho exercido</a:t>
+            </a:r>
           </a:p>
         </p:txBody>
       </p:sp>
@@ -5445,6 +5659,399 @@
 </file>
 
 <file path=ppt/slides/slide12.xml><?xml version="1.0" encoding="utf-8"?>
+<p:sld xmlns:a="http://schemas.openxmlformats.org/drawingml/2006/main" xmlns:r="http://schemas.openxmlformats.org/officeDocument/2006/relationships" xmlns:p="http://schemas.openxmlformats.org/presentationml/2006/main">
+  <p:cSld>
+    <p:spTree>
+      <p:nvGrpSpPr>
+        <p:cNvPr id="1" name=""/>
+        <p:cNvGrpSpPr/>
+        <p:nvPr/>
+      </p:nvGrpSpPr>
+      <p:grpSpPr>
+        <a:xfrm>
+          <a:off x="0" y="0"/>
+          <a:ext cx="0" cy="0"/>
+          <a:chOff x="0" y="0"/>
+          <a:chExt cx="0" cy="0"/>
+        </a:xfrm>
+      </p:grpSpPr>
+      <p:pic>
+        <p:nvPicPr>
+          <p:cNvPr id="6" name="Imagem 5" descr="Uma imagem contendo texto, mapa&#10;&#10;Descrição gerada automaticamente">
+            <a:extLst>
+              <a:ext uri="{FF2B5EF4-FFF2-40B4-BE49-F238E27FC236}">
+                <a16:creationId xmlns:a16="http://schemas.microsoft.com/office/drawing/2014/main" id="{EC8FCA96-3E49-405B-B40D-87EBF9AD9F35}"/>
+              </a:ext>
+            </a:extLst>
+          </p:cNvPr>
+          <p:cNvPicPr>
+            <a:picLocks noChangeAspect="1"/>
+          </p:cNvPicPr>
+          <p:nvPr/>
+        </p:nvPicPr>
+        <p:blipFill>
+          <a:blip r:embed="rId2">
+            <a:extLst>
+              <a:ext uri="{28A0092B-C50C-407E-A947-70E740481C1C}">
+                <a14:useLocalDpi xmlns:a14="http://schemas.microsoft.com/office/drawing/2010/main" val="0"/>
+              </a:ext>
+            </a:extLst>
+          </a:blip>
+          <a:stretch>
+            <a:fillRect/>
+          </a:stretch>
+        </p:blipFill>
+        <p:spPr>
+          <a:xfrm>
+            <a:off x="1586102" y="0"/>
+            <a:ext cx="9615298" cy="6797912"/>
+          </a:xfrm>
+          <a:prstGeom prst="rect">
+            <a:avLst/>
+          </a:prstGeom>
+        </p:spPr>
+      </p:pic>
+      <p:sp>
+        <p:nvSpPr>
+          <p:cNvPr id="9" name="CaixaDeTexto 8">
+            <a:extLst>
+              <a:ext uri="{FF2B5EF4-FFF2-40B4-BE49-F238E27FC236}">
+                <a16:creationId xmlns:a16="http://schemas.microsoft.com/office/drawing/2014/main" id="{689F66C2-96C0-44F4-92F4-31F472BD81C7}"/>
+              </a:ext>
+            </a:extLst>
+          </p:cNvPr>
+          <p:cNvSpPr txBox="1"/>
+          <p:nvPr/>
+        </p:nvSpPr>
+        <p:spPr>
+          <a:xfrm>
+            <a:off x="2752725" y="85725"/>
+            <a:ext cx="1314450" cy="369332"/>
+          </a:xfrm>
+          <a:prstGeom prst="rect">
+            <a:avLst/>
+          </a:prstGeom>
+          <a:noFill/>
+        </p:spPr>
+        <p:txBody>
+          <a:bodyPr wrap="square" rtlCol="0">
+            <a:spAutoFit/>
+          </a:bodyPr>
+          <a:lstStyle/>
+          <a:p>
+            <a:r>
+              <a:rPr lang="pt-BR" b="1" dirty="0">
+                <a:solidFill>
+                  <a:srgbClr val="0070C0"/>
+                </a:solidFill>
+              </a:rPr>
+              <a:t>Mario</a:t>
+            </a:r>
+          </a:p>
+        </p:txBody>
+      </p:sp>
+      <p:sp>
+        <p:nvSpPr>
+          <p:cNvPr id="10" name="CaixaDeTexto 9">
+            <a:extLst>
+              <a:ext uri="{FF2B5EF4-FFF2-40B4-BE49-F238E27FC236}">
+                <a16:creationId xmlns:a16="http://schemas.microsoft.com/office/drawing/2014/main" id="{A35A4D18-8625-4E11-B5E7-5EAD119BB516}"/>
+              </a:ext>
+            </a:extLst>
+          </p:cNvPr>
+          <p:cNvSpPr txBox="1"/>
+          <p:nvPr/>
+        </p:nvSpPr>
+        <p:spPr>
+          <a:xfrm>
+            <a:off x="5079301" y="64532"/>
+            <a:ext cx="1314450" cy="369332"/>
+          </a:xfrm>
+          <a:prstGeom prst="rect">
+            <a:avLst/>
+          </a:prstGeom>
+          <a:noFill/>
+        </p:spPr>
+        <p:txBody>
+          <a:bodyPr wrap="square" rtlCol="0">
+            <a:spAutoFit/>
+          </a:bodyPr>
+          <a:lstStyle/>
+          <a:p>
+            <a:r>
+              <a:rPr lang="pt-BR" b="1" dirty="0">
+                <a:solidFill>
+                  <a:srgbClr val="0070C0"/>
+                </a:solidFill>
+              </a:rPr>
+              <a:t>24</a:t>
+            </a:r>
+          </a:p>
+        </p:txBody>
+      </p:sp>
+      <p:sp>
+        <p:nvSpPr>
+          <p:cNvPr id="12" name="CaixaDeTexto 11">
+            <a:extLst>
+              <a:ext uri="{FF2B5EF4-FFF2-40B4-BE49-F238E27FC236}">
+                <a16:creationId xmlns:a16="http://schemas.microsoft.com/office/drawing/2014/main" id="{B9D0E7E8-3491-4543-85D3-68B40A915558}"/>
+              </a:ext>
+            </a:extLst>
+          </p:cNvPr>
+          <p:cNvSpPr txBox="1"/>
+          <p:nvPr/>
+        </p:nvSpPr>
+        <p:spPr>
+          <a:xfrm>
+            <a:off x="4162425" y="857250"/>
+            <a:ext cx="4495800" cy="646331"/>
+          </a:xfrm>
+          <a:prstGeom prst="rect">
+            <a:avLst/>
+          </a:prstGeom>
+          <a:noFill/>
+        </p:spPr>
+        <p:txBody>
+          <a:bodyPr wrap="square" rtlCol="0">
+            <a:spAutoFit/>
+          </a:bodyPr>
+          <a:lstStyle/>
+          <a:p>
+            <a:pPr algn="ctr"/>
+            <a:r>
+              <a:rPr lang="pt-BR" b="1" dirty="0">
+                <a:solidFill>
+                  <a:srgbClr val="0070C0"/>
+                </a:solidFill>
+              </a:rPr>
+              <a:t>Queria ter mais voz ativa na minha empresa.</a:t>
+            </a:r>
+          </a:p>
+          <a:p>
+            <a:pPr algn="ctr"/>
+            <a:r>
+              <a:rPr lang="pt-BR" b="1" dirty="0">
+                <a:solidFill>
+                  <a:srgbClr val="0070C0"/>
+                </a:solidFill>
+              </a:rPr>
+              <a:t>Queria dar mais ideias para projetos.</a:t>
+            </a:r>
+          </a:p>
+        </p:txBody>
+      </p:sp>
+      <p:sp>
+        <p:nvSpPr>
+          <p:cNvPr id="13" name="CaixaDeTexto 12">
+            <a:extLst>
+              <a:ext uri="{FF2B5EF4-FFF2-40B4-BE49-F238E27FC236}">
+                <a16:creationId xmlns:a16="http://schemas.microsoft.com/office/drawing/2014/main" id="{7DC1CBE1-C1E8-460B-901D-ED2A6B86881E}"/>
+              </a:ext>
+            </a:extLst>
+          </p:cNvPr>
+          <p:cNvSpPr txBox="1"/>
+          <p:nvPr/>
+        </p:nvSpPr>
+        <p:spPr>
+          <a:xfrm>
+            <a:off x="1893094" y="2590115"/>
+            <a:ext cx="3033712" cy="646331"/>
+          </a:xfrm>
+          <a:prstGeom prst="rect">
+            <a:avLst/>
+          </a:prstGeom>
+          <a:noFill/>
+        </p:spPr>
+        <p:txBody>
+          <a:bodyPr wrap="square" rtlCol="0">
+            <a:spAutoFit/>
+          </a:bodyPr>
+          <a:lstStyle/>
+          <a:p>
+            <a:pPr algn="ctr"/>
+            <a:r>
+              <a:rPr lang="pt-BR" b="1" dirty="0">
+                <a:solidFill>
+                  <a:srgbClr val="0070C0"/>
+                </a:solidFill>
+              </a:rPr>
+              <a:t>A empresa é muito grande, não da pra ouvir todo mundo.</a:t>
+            </a:r>
+          </a:p>
+        </p:txBody>
+      </p:sp>
+      <p:sp>
+        <p:nvSpPr>
+          <p:cNvPr id="14" name="CaixaDeTexto 13">
+            <a:extLst>
+              <a:ext uri="{FF2B5EF4-FFF2-40B4-BE49-F238E27FC236}">
+                <a16:creationId xmlns:a16="http://schemas.microsoft.com/office/drawing/2014/main" id="{0CAD9B9B-8727-4CDA-8E58-9534093BCB90}"/>
+              </a:ext>
+            </a:extLst>
+          </p:cNvPr>
+          <p:cNvSpPr txBox="1"/>
+          <p:nvPr/>
+        </p:nvSpPr>
+        <p:spPr>
+          <a:xfrm>
+            <a:off x="7855744" y="2590115"/>
+            <a:ext cx="3033712" cy="923330"/>
+          </a:xfrm>
+          <a:prstGeom prst="rect">
+            <a:avLst/>
+          </a:prstGeom>
+          <a:noFill/>
+        </p:spPr>
+        <p:txBody>
+          <a:bodyPr wrap="square" rtlCol="0">
+            <a:spAutoFit/>
+          </a:bodyPr>
+          <a:lstStyle/>
+          <a:p>
+            <a:pPr algn="ctr"/>
+            <a:r>
+              <a:rPr lang="pt-BR" b="1" dirty="0">
+                <a:solidFill>
+                  <a:srgbClr val="0070C0"/>
+                </a:solidFill>
+              </a:rPr>
+              <a:t>Muitas pessoas com boas ideias, mas sem muita influência.</a:t>
+            </a:r>
+          </a:p>
+        </p:txBody>
+      </p:sp>
+      <p:sp>
+        <p:nvSpPr>
+          <p:cNvPr id="15" name="CaixaDeTexto 14">
+            <a:extLst>
+              <a:ext uri="{FF2B5EF4-FFF2-40B4-BE49-F238E27FC236}">
+                <a16:creationId xmlns:a16="http://schemas.microsoft.com/office/drawing/2014/main" id="{133CEE61-2CE6-44C9-A0F1-F27730367E45}"/>
+              </a:ext>
+            </a:extLst>
+          </p:cNvPr>
+          <p:cNvSpPr txBox="1"/>
+          <p:nvPr/>
+        </p:nvSpPr>
+        <p:spPr>
+          <a:xfrm>
+            <a:off x="4248149" y="4232348"/>
+            <a:ext cx="4410075" cy="646331"/>
+          </a:xfrm>
+          <a:prstGeom prst="rect">
+            <a:avLst/>
+          </a:prstGeom>
+          <a:noFill/>
+        </p:spPr>
+        <p:txBody>
+          <a:bodyPr wrap="square" rtlCol="0">
+            <a:spAutoFit/>
+          </a:bodyPr>
+          <a:lstStyle/>
+          <a:p>
+            <a:pPr algn="ctr"/>
+            <a:r>
+              <a:rPr lang="pt-BR" b="1" dirty="0">
+                <a:solidFill>
+                  <a:srgbClr val="0070C0"/>
+                </a:solidFill>
+              </a:rPr>
+              <a:t>Tenta sinalizar para seu superior a falta de visibilidade para ideias promissoras.</a:t>
+            </a:r>
+          </a:p>
+        </p:txBody>
+      </p:sp>
+      <p:sp>
+        <p:nvSpPr>
+          <p:cNvPr id="16" name="CaixaDeTexto 15">
+            <a:extLst>
+              <a:ext uri="{FF2B5EF4-FFF2-40B4-BE49-F238E27FC236}">
+                <a16:creationId xmlns:a16="http://schemas.microsoft.com/office/drawing/2014/main" id="{FD053813-73C9-4B3F-8E46-22D5A0B39F32}"/>
+              </a:ext>
+            </a:extLst>
+          </p:cNvPr>
+          <p:cNvSpPr txBox="1"/>
+          <p:nvPr/>
+        </p:nvSpPr>
+        <p:spPr>
+          <a:xfrm>
+            <a:off x="2000250" y="5677584"/>
+            <a:ext cx="4410075" cy="646331"/>
+          </a:xfrm>
+          <a:prstGeom prst="rect">
+            <a:avLst/>
+          </a:prstGeom>
+          <a:noFill/>
+        </p:spPr>
+        <p:txBody>
+          <a:bodyPr wrap="square" rtlCol="0">
+            <a:spAutoFit/>
+          </a:bodyPr>
+          <a:lstStyle/>
+          <a:p>
+            <a:r>
+              <a:rPr lang="pt-BR" b="1" dirty="0">
+                <a:solidFill>
+                  <a:srgbClr val="0070C0"/>
+                </a:solidFill>
+              </a:rPr>
+              <a:t>“Pouca voz” na empresa, incapacidade de causar grandes mudanças na empresa.</a:t>
+            </a:r>
+          </a:p>
+        </p:txBody>
+      </p:sp>
+      <p:sp>
+        <p:nvSpPr>
+          <p:cNvPr id="17" name="CaixaDeTexto 16">
+            <a:extLst>
+              <a:ext uri="{FF2B5EF4-FFF2-40B4-BE49-F238E27FC236}">
+                <a16:creationId xmlns:a16="http://schemas.microsoft.com/office/drawing/2014/main" id="{C3611ACD-AA20-40E3-AEA0-466671F7511D}"/>
+              </a:ext>
+            </a:extLst>
+          </p:cNvPr>
+          <p:cNvSpPr txBox="1"/>
+          <p:nvPr/>
+        </p:nvSpPr>
+        <p:spPr>
+          <a:xfrm>
+            <a:off x="6479381" y="5677583"/>
+            <a:ext cx="4410075" cy="646331"/>
+          </a:xfrm>
+          <a:prstGeom prst="rect">
+            <a:avLst/>
+          </a:prstGeom>
+          <a:noFill/>
+        </p:spPr>
+        <p:txBody>
+          <a:bodyPr wrap="square" rtlCol="0">
+            <a:spAutoFit/>
+          </a:bodyPr>
+          <a:lstStyle/>
+          <a:p>
+            <a:r>
+              <a:rPr lang="pt-BR" b="1" dirty="0">
+                <a:solidFill>
+                  <a:srgbClr val="0070C0"/>
+                </a:solidFill>
+              </a:rPr>
+              <a:t>Maior participação na empresa, um lugar para expressar suas ideias e incentivo.</a:t>
+            </a:r>
+          </a:p>
+        </p:txBody>
+      </p:sp>
+    </p:spTree>
+    <p:extLst>
+      <p:ext uri="{BB962C8B-B14F-4D97-AF65-F5344CB8AC3E}">
+        <p14:creationId xmlns:p14="http://schemas.microsoft.com/office/powerpoint/2010/main" val="3404600451"/>
+      </p:ext>
+    </p:extLst>
+  </p:cSld>
+  <p:clrMapOvr>
+    <a:masterClrMapping/>
+  </p:clrMapOvr>
+</p:sld>
+</file>
+
+<file path=ppt/slides/slide13.xml><?xml version="1.0" encoding="utf-8"?>
 <p:sld xmlns:a="http://schemas.openxmlformats.org/drawingml/2006/main" xmlns:r="http://schemas.openxmlformats.org/officeDocument/2006/relationships" xmlns:p="http://schemas.openxmlformats.org/presentationml/2006/main">
   <p:cSld>
     <p:spTree>
@@ -7326,15 +7933,22 @@
           <a:lstStyle/>
           <a:p>
             <a:r>
-              <a:rPr lang="pt-BR" b="1" dirty="0">
+              <a:rPr lang="pt-BR" b="1">
                 <a:solidFill>
                   <a:srgbClr val="FDC500"/>
                 </a:solidFill>
                 <a:latin typeface="Rajdhani" panose="02000000000000000000" pitchFamily="2" charset="0"/>
                 <a:cs typeface="Rajdhani" panose="02000000000000000000" pitchFamily="2" charset="0"/>
               </a:rPr>
-              <a:t>Mapa de Empatia</a:t>
-            </a:r>
+              <a:t>Wireframe Bootcamp</a:t>
+            </a:r>
+            <a:endParaRPr lang="pt-BR" b="1" dirty="0">
+              <a:solidFill>
+                <a:srgbClr val="FDC500"/>
+              </a:solidFill>
+              <a:latin typeface="Rajdhani" panose="02000000000000000000" pitchFamily="2" charset="0"/>
+              <a:cs typeface="Rajdhani" panose="02000000000000000000" pitchFamily="2" charset="0"/>
+            </a:endParaRPr>
           </a:p>
         </p:txBody>
       </p:sp>
@@ -7374,7 +7988,7 @@
           <p:cNvPr id="4" name="Imagem 3" descr="Logotipo, Ícone&#10;&#10;Descrição gerada automaticamente">
             <a:extLst>
               <a:ext uri="{FF2B5EF4-FFF2-40B4-BE49-F238E27FC236}">
-                <a16:creationId xmlns:a16="http://schemas.microsoft.com/office/drawing/2014/main" id="{66976179-B6F2-4140-AF27-573BF867F9BE}"/>
+                <a16:creationId xmlns:a16="http://schemas.microsoft.com/office/drawing/2014/main" id="{DEDD4ADF-B7D9-4753-AFC5-CD121136A28B}"/>
               </a:ext>
             </a:extLst>
           </p:cNvPr>
@@ -7408,7 +8022,7 @@
     </p:spTree>
     <p:extLst>
       <p:ext uri="{BB962C8B-B14F-4D97-AF65-F5344CB8AC3E}">
-        <p14:creationId xmlns:p14="http://schemas.microsoft.com/office/powerpoint/2010/main" val="3404600451"/>
+        <p14:creationId xmlns:p14="http://schemas.microsoft.com/office/powerpoint/2010/main" val="1763133396"/>
       </p:ext>
     </p:extLst>
   </p:cSld>

</xml_diff>

<commit_message>
Atualização do ppt Apresentação Sprint 1
</commit_message>
<xml_diff>
--- a/Documentos/Apresentação - Sprint 1.pptx
+++ b/Documentos/Apresentação - Sprint 1.pptx
@@ -127,7 +127,7 @@
 <file path=ppt/revisionInfo.xml><?xml version="1.0" encoding="utf-8"?>
 <p1510:revInfo xmlns:a="http://schemas.openxmlformats.org/drawingml/2006/main" xmlns:r="http://schemas.openxmlformats.org/officeDocument/2006/relationships" xmlns:p1510="http://schemas.microsoft.com/office/powerpoint/2015/10/main">
   <p1510:revLst>
-    <p1510:client id="{D0F5F4C9-8254-49D2-8834-678155235284}" v="12" dt="2021-03-03T20:08:44.385"/>
+    <p1510:client id="{5D2A2FDB-CC6E-45FF-AD91-6C8DF8398D29}" v="1" dt="2021-03-05T00:01:16.996"/>
   </p1510:revLst>
 </p1510:revInfo>
 </file>
@@ -316,6 +316,70 @@
       </pc:sldChg>
     </pc:docChg>
   </pc:docChgLst>
+  <pc:docChgLst>
+    <pc:chgData name="Rodrigo Cunha" userId="485e093414a33d36" providerId="LiveId" clId="{5D2A2FDB-CC6E-45FF-AD91-6C8DF8398D29}"/>
+    <pc:docChg chg="undo custSel modSld">
+      <pc:chgData name="Rodrigo Cunha" userId="485e093414a33d36" providerId="LiveId" clId="{5D2A2FDB-CC6E-45FF-AD91-6C8DF8398D29}" dt="2021-03-05T00:07:59.886" v="501" actId="478"/>
+      <pc:docMkLst>
+        <pc:docMk/>
+      </pc:docMkLst>
+      <pc:sldChg chg="addSp delSp modSp mod setBg">
+        <pc:chgData name="Rodrigo Cunha" userId="485e093414a33d36" providerId="LiveId" clId="{5D2A2FDB-CC6E-45FF-AD91-6C8DF8398D29}" dt="2021-03-05T00:07:59.886" v="501" actId="478"/>
+        <pc:sldMkLst>
+          <pc:docMk/>
+          <pc:sldMk cId="3404600451" sldId="261"/>
+        </pc:sldMkLst>
+        <pc:spChg chg="mod">
+          <ac:chgData name="Rodrigo Cunha" userId="485e093414a33d36" providerId="LiveId" clId="{5D2A2FDB-CC6E-45FF-AD91-6C8DF8398D29}" dt="2021-03-05T00:03:57.623" v="498" actId="1076"/>
+          <ac:spMkLst>
+            <pc:docMk/>
+            <pc:sldMk cId="3404600451" sldId="261"/>
+            <ac:spMk id="12" creationId="{B9D0E7E8-3491-4543-85D3-68B40A915558}"/>
+          </ac:spMkLst>
+        </pc:spChg>
+        <pc:spChg chg="mod">
+          <ac:chgData name="Rodrigo Cunha" userId="485e093414a33d36" providerId="LiveId" clId="{5D2A2FDB-CC6E-45FF-AD91-6C8DF8398D29}" dt="2021-03-04T23:57:43.898" v="244" actId="1076"/>
+          <ac:spMkLst>
+            <pc:docMk/>
+            <pc:sldMk cId="3404600451" sldId="261"/>
+            <ac:spMk id="13" creationId="{7DC1CBE1-C1E8-460B-901D-ED2A6B86881E}"/>
+          </ac:spMkLst>
+        </pc:spChg>
+        <pc:spChg chg="mod">
+          <ac:chgData name="Rodrigo Cunha" userId="485e093414a33d36" providerId="LiveId" clId="{5D2A2FDB-CC6E-45FF-AD91-6C8DF8398D29}" dt="2021-03-05T00:01:11.529" v="408" actId="1076"/>
+          <ac:spMkLst>
+            <pc:docMk/>
+            <pc:sldMk cId="3404600451" sldId="261"/>
+            <ac:spMk id="14" creationId="{0CAD9B9B-8727-4CDA-8E58-9534093BCB90}"/>
+          </ac:spMkLst>
+        </pc:spChg>
+        <pc:spChg chg="mod">
+          <ac:chgData name="Rodrigo Cunha" userId="485e093414a33d36" providerId="LiveId" clId="{5D2A2FDB-CC6E-45FF-AD91-6C8DF8398D29}" dt="2021-03-05T00:00:09.260" v="354" actId="20577"/>
+          <ac:spMkLst>
+            <pc:docMk/>
+            <pc:sldMk cId="3404600451" sldId="261"/>
+            <ac:spMk id="15" creationId="{133CEE61-2CE6-44C9-A0F1-F27730367E45}"/>
+          </ac:spMkLst>
+        </pc:spChg>
+        <pc:spChg chg="mod">
+          <ac:chgData name="Rodrigo Cunha" userId="485e093414a33d36" providerId="LiveId" clId="{5D2A2FDB-CC6E-45FF-AD91-6C8DF8398D29}" dt="2021-03-05T00:03:28.322" v="451" actId="20577"/>
+          <ac:spMkLst>
+            <pc:docMk/>
+            <pc:sldMk cId="3404600451" sldId="261"/>
+            <ac:spMk id="16" creationId="{FD053813-73C9-4B3F-8E46-22D5A0B39F32}"/>
+          </ac:spMkLst>
+        </pc:spChg>
+        <pc:picChg chg="add del mod">
+          <ac:chgData name="Rodrigo Cunha" userId="485e093414a33d36" providerId="LiveId" clId="{5D2A2FDB-CC6E-45FF-AD91-6C8DF8398D29}" dt="2021-03-05T00:07:59.886" v="501" actId="478"/>
+          <ac:picMkLst>
+            <pc:docMk/>
+            <pc:sldMk cId="3404600451" sldId="261"/>
+            <ac:picMk id="6" creationId="{EC8FCA96-3E49-405B-B40D-87EBF9AD9F35}"/>
+          </ac:picMkLst>
+        </pc:picChg>
+      </pc:sldChg>
+    </pc:docChg>
+  </pc:docChgLst>
 </pc:chgInfo>
 </file>
 
@@ -466,7 +530,7 @@
           <a:p>
             <a:fld id="{355F770F-5898-4050-BE6B-88A08486AE6B}" type="datetimeFigureOut">
               <a:rPr lang="pt-BR" smtClean="0"/>
-              <a:t>03/03/2021</a:t>
+              <a:t>04/03/2021</a:t>
             </a:fld>
             <a:endParaRPr lang="pt-BR"/>
           </a:p>
@@ -664,7 +728,7 @@
           <a:p>
             <a:fld id="{355F770F-5898-4050-BE6B-88A08486AE6B}" type="datetimeFigureOut">
               <a:rPr lang="pt-BR" smtClean="0"/>
-              <a:t>03/03/2021</a:t>
+              <a:t>04/03/2021</a:t>
             </a:fld>
             <a:endParaRPr lang="pt-BR"/>
           </a:p>
@@ -872,7 +936,7 @@
           <a:p>
             <a:fld id="{355F770F-5898-4050-BE6B-88A08486AE6B}" type="datetimeFigureOut">
               <a:rPr lang="pt-BR" smtClean="0"/>
-              <a:t>03/03/2021</a:t>
+              <a:t>04/03/2021</a:t>
             </a:fld>
             <a:endParaRPr lang="pt-BR"/>
           </a:p>
@@ -1070,7 +1134,7 @@
           <a:p>
             <a:fld id="{355F770F-5898-4050-BE6B-88A08486AE6B}" type="datetimeFigureOut">
               <a:rPr lang="pt-BR" smtClean="0"/>
-              <a:t>03/03/2021</a:t>
+              <a:t>04/03/2021</a:t>
             </a:fld>
             <a:endParaRPr lang="pt-BR"/>
           </a:p>
@@ -1345,7 +1409,7 @@
           <a:p>
             <a:fld id="{355F770F-5898-4050-BE6B-88A08486AE6B}" type="datetimeFigureOut">
               <a:rPr lang="pt-BR" smtClean="0"/>
-              <a:t>03/03/2021</a:t>
+              <a:t>04/03/2021</a:t>
             </a:fld>
             <a:endParaRPr lang="pt-BR"/>
           </a:p>
@@ -1610,7 +1674,7 @@
           <a:p>
             <a:fld id="{355F770F-5898-4050-BE6B-88A08486AE6B}" type="datetimeFigureOut">
               <a:rPr lang="pt-BR" smtClean="0"/>
-              <a:t>03/03/2021</a:t>
+              <a:t>04/03/2021</a:t>
             </a:fld>
             <a:endParaRPr lang="pt-BR"/>
           </a:p>
@@ -2022,7 +2086,7 @@
           <a:p>
             <a:fld id="{355F770F-5898-4050-BE6B-88A08486AE6B}" type="datetimeFigureOut">
               <a:rPr lang="pt-BR" smtClean="0"/>
-              <a:t>03/03/2021</a:t>
+              <a:t>04/03/2021</a:t>
             </a:fld>
             <a:endParaRPr lang="pt-BR"/>
           </a:p>
@@ -2163,7 +2227,7 @@
           <a:p>
             <a:fld id="{355F770F-5898-4050-BE6B-88A08486AE6B}" type="datetimeFigureOut">
               <a:rPr lang="pt-BR" smtClean="0"/>
-              <a:t>03/03/2021</a:t>
+              <a:t>04/03/2021</a:t>
             </a:fld>
             <a:endParaRPr lang="pt-BR"/>
           </a:p>
@@ -2276,7 +2340,7 @@
           <a:p>
             <a:fld id="{355F770F-5898-4050-BE6B-88A08486AE6B}" type="datetimeFigureOut">
               <a:rPr lang="pt-BR" smtClean="0"/>
-              <a:t>03/03/2021</a:t>
+              <a:t>04/03/2021</a:t>
             </a:fld>
             <a:endParaRPr lang="pt-BR"/>
           </a:p>
@@ -2587,7 +2651,7 @@
           <a:p>
             <a:fld id="{355F770F-5898-4050-BE6B-88A08486AE6B}" type="datetimeFigureOut">
               <a:rPr lang="pt-BR" smtClean="0"/>
-              <a:t>03/03/2021</a:t>
+              <a:t>04/03/2021</a:t>
             </a:fld>
             <a:endParaRPr lang="pt-BR"/>
           </a:p>
@@ -2875,7 +2939,7 @@
           <a:p>
             <a:fld id="{355F770F-5898-4050-BE6B-88A08486AE6B}" type="datetimeFigureOut">
               <a:rPr lang="pt-BR" smtClean="0"/>
-              <a:t>03/03/2021</a:t>
+              <a:t>04/03/2021</a:t>
             </a:fld>
             <a:endParaRPr lang="pt-BR"/>
           </a:p>
@@ -3119,7 +3183,7 @@
           <a:p>
             <a:fld id="{355F770F-5898-4050-BE6B-88A08486AE6B}" type="datetimeFigureOut">
               <a:rPr lang="pt-BR" smtClean="0"/>
-              <a:t>03/03/2021</a:t>
+              <a:t>04/03/2021</a:t>
             </a:fld>
             <a:endParaRPr lang="pt-BR"/>
           </a:p>
@@ -5661,6 +5725,14 @@
 <file path=ppt/slides/slide12.xml><?xml version="1.0" encoding="utf-8"?>
 <p:sld xmlns:a="http://schemas.openxmlformats.org/drawingml/2006/main" xmlns:r="http://schemas.openxmlformats.org/officeDocument/2006/relationships" xmlns:p="http://schemas.openxmlformats.org/presentationml/2006/main">
   <p:cSld>
+    <p:bg>
+      <p:bgPr>
+        <a:solidFill>
+          <a:schemeClr val="bg1"/>
+        </a:solidFill>
+        <a:effectLst/>
+      </p:bgPr>
+    </p:bg>
     <p:spTree>
       <p:nvGrpSpPr>
         <p:cNvPr id="1" name=""/>
@@ -5703,7 +5775,7 @@
         </p:blipFill>
         <p:spPr>
           <a:xfrm>
-            <a:off x="1586102" y="0"/>
+            <a:off x="1500377" y="30044"/>
             <a:ext cx="9615298" cy="6797912"/>
           </a:xfrm>
           <a:prstGeom prst="rect">
@@ -5803,8 +5875,8 @@
         </p:nvSpPr>
         <p:spPr>
           <a:xfrm>
-            <a:off x="4162425" y="857250"/>
-            <a:ext cx="4495800" cy="646331"/>
+            <a:off x="4145851" y="631520"/>
+            <a:ext cx="4495800" cy="1200329"/>
           </a:xfrm>
           <a:prstGeom prst="rect">
             <a:avLst/>
@@ -5838,6 +5910,28 @@
               <a:t>Queria dar mais ideias para projetos.</a:t>
             </a:r>
           </a:p>
+          <a:p>
+            <a:pPr algn="ctr"/>
+            <a:r>
+              <a:rPr lang="pt-BR" b="1" dirty="0">
+                <a:solidFill>
+                  <a:srgbClr val="0070C0"/>
+                </a:solidFill>
+              </a:rPr>
+              <a:t>Receio de sugerir ideias para outras áreas.</a:t>
+            </a:r>
+          </a:p>
+          <a:p>
+            <a:pPr algn="ctr"/>
+            <a:r>
+              <a:rPr lang="pt-BR" b="1" dirty="0">
+                <a:solidFill>
+                  <a:srgbClr val="0070C0"/>
+                </a:solidFill>
+              </a:rPr>
+              <a:t>Busca pelo reconhecimento na empresa.</a:t>
+            </a:r>
+          </a:p>
         </p:txBody>
       </p:sp>
       <p:sp>
@@ -5854,8 +5948,8 @@
         </p:nvSpPr>
         <p:spPr>
           <a:xfrm>
-            <a:off x="1893094" y="2590115"/>
-            <a:ext cx="3033712" cy="646331"/>
+            <a:off x="1797844" y="1944635"/>
+            <a:ext cx="3033712" cy="2031325"/>
           </a:xfrm>
           <a:prstGeom prst="rect">
             <a:avLst/>
@@ -5878,6 +5972,28 @@
               <a:t>A empresa é muito grande, não da pra ouvir todo mundo.</a:t>
             </a:r>
           </a:p>
+          <a:p>
+            <a:pPr algn="ctr"/>
+            <a:r>
+              <a:rPr lang="pt-BR" b="1" dirty="0">
+                <a:solidFill>
+                  <a:srgbClr val="0070C0"/>
+                </a:solidFill>
+              </a:rPr>
+              <a:t>Boa ideia, mas acho difícil ser implementada (muita burocracia).</a:t>
+            </a:r>
+          </a:p>
+          <a:p>
+            <a:pPr algn="ctr"/>
+            <a:r>
+              <a:rPr lang="pt-BR" b="1" dirty="0">
+                <a:solidFill>
+                  <a:srgbClr val="0070C0"/>
+                </a:solidFill>
+              </a:rPr>
+              <a:t>Podcasts sobre inovação, boas práticas da área, ...</a:t>
+            </a:r>
+          </a:p>
         </p:txBody>
       </p:sp>
       <p:sp>
@@ -5894,8 +6010,8 @@
         </p:nvSpPr>
         <p:spPr>
           <a:xfrm>
-            <a:off x="7855744" y="2590115"/>
-            <a:ext cx="3033712" cy="923330"/>
+            <a:off x="8086727" y="1944635"/>
+            <a:ext cx="3326415" cy="2308324"/>
           </a:xfrm>
           <a:prstGeom prst="rect">
             <a:avLst/>
@@ -5918,6 +6034,39 @@
               <a:t>Muitas pessoas com boas ideias, mas sem muita influência.</a:t>
             </a:r>
           </a:p>
+          <a:p>
+            <a:pPr algn="ctr"/>
+            <a:r>
+              <a:rPr lang="pt-BR" b="1" dirty="0">
+                <a:solidFill>
+                  <a:srgbClr val="0070C0"/>
+                </a:solidFill>
+              </a:rPr>
+              <a:t>Problemas que sozinho não consegue resolver.</a:t>
+            </a:r>
+          </a:p>
+          <a:p>
+            <a:pPr algn="ctr"/>
+            <a:r>
+              <a:rPr lang="pt-BR" b="1" dirty="0">
+                <a:solidFill>
+                  <a:srgbClr val="0070C0"/>
+                </a:solidFill>
+              </a:rPr>
+              <a:t>Assiste palestras e eventos ligados a inovação.</a:t>
+            </a:r>
+          </a:p>
+          <a:p>
+            <a:pPr algn="ctr"/>
+            <a:r>
+              <a:rPr lang="pt-BR" b="1" dirty="0">
+                <a:solidFill>
+                  <a:srgbClr val="0070C0"/>
+                </a:solidFill>
+              </a:rPr>
+              <a:t>Assiste conteúdos ligados a sua área.</a:t>
+            </a:r>
+          </a:p>
         </p:txBody>
       </p:sp>
       <p:sp>
@@ -5934,8 +6083,8 @@
         </p:nvSpPr>
         <p:spPr>
           <a:xfrm>
-            <a:off x="4248149" y="4232348"/>
-            <a:ext cx="4410075" cy="646331"/>
+            <a:off x="4274343" y="4001941"/>
+            <a:ext cx="4410075" cy="1200329"/>
           </a:xfrm>
           <a:prstGeom prst="rect">
             <a:avLst/>
@@ -5956,6 +6105,17 @@
                 </a:solidFill>
               </a:rPr>
               <a:t>Tenta sinalizar para seu superior a falta de visibilidade para ideias promissoras.</a:t>
+            </a:r>
+          </a:p>
+          <a:p>
+            <a:pPr algn="ctr"/>
+            <a:r>
+              <a:rPr lang="pt-BR" b="1" dirty="0">
+                <a:solidFill>
+                  <a:srgbClr val="0070C0"/>
+                </a:solidFill>
+              </a:rPr>
+              <a:t>Conversa com amigos sobre possíveis mudanças na empresa.</a:t>
             </a:r>
           </a:p>
         </p:txBody>

</xml_diff>